<commit_message>
paper english IEEE Signed-off-by: IKA RA <pujakusumae@hotmail.com>
</commit_message>
<xml_diff>
--- a/DOC/PROGRES/lima.pptx
+++ b/DOC/PROGRES/lima.pptx
@@ -14,14 +14,15 @@
     <p:sldId id="277" r:id="rId8"/>
     <p:sldId id="279" r:id="rId9"/>
     <p:sldId id="269" r:id="rId10"/>
-    <p:sldId id="262" r:id="rId11"/>
-    <p:sldId id="263" r:id="rId12"/>
-    <p:sldId id="264" r:id="rId13"/>
-    <p:sldId id="270" r:id="rId14"/>
-    <p:sldId id="265" r:id="rId15"/>
-    <p:sldId id="266" r:id="rId16"/>
-    <p:sldId id="267" r:id="rId17"/>
-    <p:sldId id="261" r:id="rId18"/>
+    <p:sldId id="280" r:id="rId11"/>
+    <p:sldId id="262" r:id="rId12"/>
+    <p:sldId id="263" r:id="rId13"/>
+    <p:sldId id="264" r:id="rId14"/>
+    <p:sldId id="270" r:id="rId15"/>
+    <p:sldId id="265" r:id="rId16"/>
+    <p:sldId id="266" r:id="rId17"/>
+    <p:sldId id="267" r:id="rId18"/>
+    <p:sldId id="261" r:id="rId19"/>
   </p:sldIdLst>
   <p:sldSz cx="12192000" cy="6858000"/>
   <p:notesSz cx="6858000" cy="9144000"/>
@@ -277,7 +278,7 @@
           <a:p>
             <a:fld id="{68B45DF6-CD02-457E-887F-3BA736D04E05}" type="datetimeFigureOut">
               <a:rPr lang="en-ID" smtClean="0"/>
-              <a:t>14/11/2020</a:t>
+              <a:t>26/11/2020</a:t>
             </a:fld>
             <a:endParaRPr lang="en-ID"/>
           </a:p>
@@ -477,7 +478,7 @@
           <a:p>
             <a:fld id="{68B45DF6-CD02-457E-887F-3BA736D04E05}" type="datetimeFigureOut">
               <a:rPr lang="en-ID" smtClean="0"/>
-              <a:t>14/11/2020</a:t>
+              <a:t>26/11/2020</a:t>
             </a:fld>
             <a:endParaRPr lang="en-ID"/>
           </a:p>
@@ -687,7 +688,7 @@
           <a:p>
             <a:fld id="{68B45DF6-CD02-457E-887F-3BA736D04E05}" type="datetimeFigureOut">
               <a:rPr lang="en-ID" smtClean="0"/>
-              <a:t>14/11/2020</a:t>
+              <a:t>26/11/2020</a:t>
             </a:fld>
             <a:endParaRPr lang="en-ID"/>
           </a:p>
@@ -887,7 +888,7 @@
           <a:p>
             <a:fld id="{68B45DF6-CD02-457E-887F-3BA736D04E05}" type="datetimeFigureOut">
               <a:rPr lang="en-ID" smtClean="0"/>
-              <a:t>14/11/2020</a:t>
+              <a:t>26/11/2020</a:t>
             </a:fld>
             <a:endParaRPr lang="en-ID"/>
           </a:p>
@@ -1163,7 +1164,7 @@
           <a:p>
             <a:fld id="{68B45DF6-CD02-457E-887F-3BA736D04E05}" type="datetimeFigureOut">
               <a:rPr lang="en-ID" smtClean="0"/>
-              <a:t>14/11/2020</a:t>
+              <a:t>26/11/2020</a:t>
             </a:fld>
             <a:endParaRPr lang="en-ID"/>
           </a:p>
@@ -1431,7 +1432,7 @@
           <a:p>
             <a:fld id="{68B45DF6-CD02-457E-887F-3BA736D04E05}" type="datetimeFigureOut">
               <a:rPr lang="en-ID" smtClean="0"/>
-              <a:t>14/11/2020</a:t>
+              <a:t>26/11/2020</a:t>
             </a:fld>
             <a:endParaRPr lang="en-ID"/>
           </a:p>
@@ -1846,7 +1847,7 @@
           <a:p>
             <a:fld id="{68B45DF6-CD02-457E-887F-3BA736D04E05}" type="datetimeFigureOut">
               <a:rPr lang="en-ID" smtClean="0"/>
-              <a:t>14/11/2020</a:t>
+              <a:t>26/11/2020</a:t>
             </a:fld>
             <a:endParaRPr lang="en-ID"/>
           </a:p>
@@ -1988,7 +1989,7 @@
           <a:p>
             <a:fld id="{68B45DF6-CD02-457E-887F-3BA736D04E05}" type="datetimeFigureOut">
               <a:rPr lang="en-ID" smtClean="0"/>
-              <a:t>14/11/2020</a:t>
+              <a:t>26/11/2020</a:t>
             </a:fld>
             <a:endParaRPr lang="en-ID"/>
           </a:p>
@@ -2101,7 +2102,7 @@
           <a:p>
             <a:fld id="{68B45DF6-CD02-457E-887F-3BA736D04E05}" type="datetimeFigureOut">
               <a:rPr lang="en-ID" smtClean="0"/>
-              <a:t>14/11/2020</a:t>
+              <a:t>26/11/2020</a:t>
             </a:fld>
             <a:endParaRPr lang="en-ID"/>
           </a:p>
@@ -2414,7 +2415,7 @@
           <a:p>
             <a:fld id="{68B45DF6-CD02-457E-887F-3BA736D04E05}" type="datetimeFigureOut">
               <a:rPr lang="en-ID" smtClean="0"/>
-              <a:t>14/11/2020</a:t>
+              <a:t>26/11/2020</a:t>
             </a:fld>
             <a:endParaRPr lang="en-ID"/>
           </a:p>
@@ -2703,7 +2704,7 @@
           <a:p>
             <a:fld id="{68B45DF6-CD02-457E-887F-3BA736D04E05}" type="datetimeFigureOut">
               <a:rPr lang="en-ID" smtClean="0"/>
-              <a:t>14/11/2020</a:t>
+              <a:t>26/11/2020</a:t>
             </a:fld>
             <a:endParaRPr lang="en-ID"/>
           </a:p>
@@ -2946,7 +2947,7 @@
           <a:p>
             <a:fld id="{68B45DF6-CD02-457E-887F-3BA736D04E05}" type="datetimeFigureOut">
               <a:rPr lang="en-ID" smtClean="0"/>
-              <a:t>14/11/2020</a:t>
+              <a:t>26/11/2020</a:t>
             </a:fld>
             <a:endParaRPr lang="en-ID"/>
           </a:p>
@@ -3465,6 +3466,93 @@
           <p:cNvPr id="2" name="Title 1">
             <a:extLst>
               <a:ext uri="{FF2B5EF4-FFF2-40B4-BE49-F238E27FC236}">
+                <a16:creationId xmlns:a16="http://schemas.microsoft.com/office/drawing/2014/main" id="{D7240380-ECDF-43C4-9C47-0E86B4173D39}"/>
+              </a:ext>
+            </a:extLst>
+          </p:cNvPr>
+          <p:cNvSpPr>
+            <a:spLocks noGrp="1"/>
+          </p:cNvSpPr>
+          <p:nvPr>
+            <p:ph type="title"/>
+          </p:nvPr>
+        </p:nvSpPr>
+        <p:spPr/>
+        <p:txBody>
+          <a:bodyPr/>
+          <a:lstStyle/>
+          <a:p>
+            <a:endParaRPr lang="en-ID"/>
+          </a:p>
+        </p:txBody>
+      </p:sp>
+      <p:pic>
+        <p:nvPicPr>
+          <p:cNvPr id="4" name="Content Placeholder 3">
+            <a:extLst>
+              <a:ext uri="{FF2B5EF4-FFF2-40B4-BE49-F238E27FC236}">
+                <a16:creationId xmlns:a16="http://schemas.microsoft.com/office/drawing/2014/main" id="{80AA6F40-C628-4840-A54F-C5FDB729134E}"/>
+              </a:ext>
+            </a:extLst>
+          </p:cNvPr>
+          <p:cNvPicPr>
+            <a:picLocks noGrp="1" noChangeAspect="1"/>
+          </p:cNvPicPr>
+          <p:nvPr>
+            <p:ph idx="1"/>
+          </p:nvPr>
+        </p:nvPicPr>
+        <p:blipFill>
+          <a:blip r:embed="rId2"/>
+          <a:stretch>
+            <a:fillRect/>
+          </a:stretch>
+        </p:blipFill>
+        <p:spPr>
+          <a:xfrm>
+            <a:off x="3429000" y="2001044"/>
+            <a:ext cx="5334000" cy="4000500"/>
+          </a:xfrm>
+          <a:prstGeom prst="rect">
+            <a:avLst/>
+          </a:prstGeom>
+        </p:spPr>
+      </p:pic>
+    </p:spTree>
+    <p:extLst>
+      <p:ext uri="{BB962C8B-B14F-4D97-AF65-F5344CB8AC3E}">
+        <p14:creationId xmlns:p14="http://schemas.microsoft.com/office/powerpoint/2010/main" val="575478446"/>
+      </p:ext>
+    </p:extLst>
+  </p:cSld>
+  <p:clrMapOvr>
+    <a:masterClrMapping/>
+  </p:clrMapOvr>
+</p:sld>
+</file>
+
+<file path=ppt/slides/slide11.xml><?xml version="1.0" encoding="utf-8"?>
+<p:sld xmlns:a="http://schemas.openxmlformats.org/drawingml/2006/main" xmlns:r="http://schemas.openxmlformats.org/officeDocument/2006/relationships" xmlns:p="http://schemas.openxmlformats.org/presentationml/2006/main">
+  <p:cSld>
+    <p:spTree>
+      <p:nvGrpSpPr>
+        <p:cNvPr id="1" name=""/>
+        <p:cNvGrpSpPr/>
+        <p:nvPr/>
+      </p:nvGrpSpPr>
+      <p:grpSpPr>
+        <a:xfrm>
+          <a:off x="0" y="0"/>
+          <a:ext cx="0" cy="0"/>
+          <a:chOff x="0" y="0"/>
+          <a:chExt cx="0" cy="0"/>
+        </a:xfrm>
+      </p:grpSpPr>
+      <p:sp>
+        <p:nvSpPr>
+          <p:cNvPr id="2" name="Title 1">
+            <a:extLst>
+              <a:ext uri="{FF2B5EF4-FFF2-40B4-BE49-F238E27FC236}">
                 <a16:creationId xmlns:a16="http://schemas.microsoft.com/office/drawing/2014/main" id="{8D161F7D-F81C-4D8E-B1B6-92052A5C494D}"/>
               </a:ext>
             </a:extLst>
@@ -3524,8 +3612,8 @@
           </a:prstGeom>
         </p:spPr>
       </p:pic>
-      <mc:AlternateContent xmlns:mc="http://schemas.openxmlformats.org/markup-compatibility/2006">
-        <mc:Choice xmlns:a14="http://schemas.microsoft.com/office/drawing/2010/main" Requires="a14">
+      <mc:AlternateContent xmlns:mc="http://schemas.openxmlformats.org/markup-compatibility/2006" xmlns:a14="http://schemas.microsoft.com/office/drawing/2010/main">
+        <mc:Choice Requires="a14">
           <p:sp>
             <p:nvSpPr>
               <p:cNvPr id="5" name="Content Placeholder 2">
@@ -3816,7 +3904,7 @@
             </p:txBody>
           </p:sp>
         </mc:Choice>
-        <mc:Fallback>
+        <mc:Fallback xmlns="">
           <p:sp>
             <p:nvSpPr>
               <p:cNvPr id="5" name="Content Placeholder 2">
@@ -3874,7 +3962,7 @@
 </p:sld>
 </file>
 
-<file path=ppt/slides/slide11.xml><?xml version="1.0" encoding="utf-8"?>
+<file path=ppt/slides/slide12.xml><?xml version="1.0" encoding="utf-8"?>
 <p:sld xmlns:a="http://schemas.openxmlformats.org/drawingml/2006/main" xmlns:r="http://schemas.openxmlformats.org/officeDocument/2006/relationships" xmlns:p="http://schemas.openxmlformats.org/presentationml/2006/main">
   <p:cSld>
     <p:spTree>
@@ -3966,7 +4054,7 @@
 </p:sld>
 </file>
 
-<file path=ppt/slides/slide12.xml><?xml version="1.0" encoding="utf-8"?>
+<file path=ppt/slides/slide13.xml><?xml version="1.0" encoding="utf-8"?>
 <p:sld xmlns:a="http://schemas.openxmlformats.org/drawingml/2006/main" xmlns:r="http://schemas.openxmlformats.org/officeDocument/2006/relationships" xmlns:p="http://schemas.openxmlformats.org/presentationml/2006/main">
   <p:cSld>
     <p:spTree>
@@ -4063,7 +4151,7 @@
 </p:sld>
 </file>
 
-<file path=ppt/slides/slide13.xml><?xml version="1.0" encoding="utf-8"?>
+<file path=ppt/slides/slide14.xml><?xml version="1.0" encoding="utf-8"?>
 <p:sld xmlns:a="http://schemas.openxmlformats.org/drawingml/2006/main" xmlns:r="http://schemas.openxmlformats.org/officeDocument/2006/relationships" xmlns:p="http://schemas.openxmlformats.org/presentationml/2006/main">
   <p:cSld>
     <p:spTree>
@@ -4182,8 +4270,8 @@
           </a:prstGeom>
         </p:spPr>
       </p:pic>
-      <mc:AlternateContent xmlns:mc="http://schemas.openxmlformats.org/markup-compatibility/2006">
-        <mc:Choice xmlns:a14="http://schemas.microsoft.com/office/drawing/2010/main" Requires="a14">
+      <mc:AlternateContent xmlns:mc="http://schemas.openxmlformats.org/markup-compatibility/2006" xmlns:a14="http://schemas.microsoft.com/office/drawing/2010/main">
+        <mc:Choice Requires="a14">
           <p:sp>
             <p:nvSpPr>
               <p:cNvPr id="9" name="Rectangle 8">
@@ -4550,7 +4638,7 @@
             </p:txBody>
           </p:sp>
         </mc:Choice>
-        <mc:Fallback>
+        <mc:Fallback xmlns="">
           <p:sp>
             <p:nvSpPr>
               <p:cNvPr id="9" name="Rectangle 8">
@@ -4600,8 +4688,8 @@
           </p:sp>
         </mc:Fallback>
       </mc:AlternateContent>
-      <mc:AlternateContent xmlns:mc="http://schemas.openxmlformats.org/markup-compatibility/2006">
-        <mc:Choice xmlns:a14="http://schemas.microsoft.com/office/drawing/2010/main" Requires="a14">
+      <mc:AlternateContent xmlns:mc="http://schemas.openxmlformats.org/markup-compatibility/2006" xmlns:a14="http://schemas.microsoft.com/office/drawing/2010/main">
+        <mc:Choice Requires="a14">
           <p:sp>
             <p:nvSpPr>
               <p:cNvPr id="11" name="TextBox 10">
@@ -4942,7 +5030,7 @@
             </p:txBody>
           </p:sp>
         </mc:Choice>
-        <mc:Fallback>
+        <mc:Fallback xmlns="">
           <p:sp>
             <p:nvSpPr>
               <p:cNvPr id="11" name="TextBox 10">
@@ -5034,8 +5122,8 @@
           </a:p>
         </p:txBody>
       </p:sp>
-      <mc:AlternateContent xmlns:mc="http://schemas.openxmlformats.org/markup-compatibility/2006">
-        <mc:Choice xmlns:a14="http://schemas.microsoft.com/office/drawing/2010/main" Requires="a14">
+      <mc:AlternateContent xmlns:mc="http://schemas.openxmlformats.org/markup-compatibility/2006" xmlns:a14="http://schemas.microsoft.com/office/drawing/2010/main">
+        <mc:Choice Requires="a14">
           <p:sp>
             <p:nvSpPr>
               <p:cNvPr id="15" name="Rectangle 14">
@@ -5161,7 +5249,7 @@
             </p:txBody>
           </p:sp>
         </mc:Choice>
-        <mc:Fallback>
+        <mc:Fallback xmlns="">
           <p:sp>
             <p:nvSpPr>
               <p:cNvPr id="15" name="Rectangle 14">
@@ -5222,7 +5310,7 @@
 </p:sld>
 </file>
 
-<file path=ppt/slides/slide14.xml><?xml version="1.0" encoding="utf-8"?>
+<file path=ppt/slides/slide15.xml><?xml version="1.0" encoding="utf-8"?>
 <p:sld xmlns:a="http://schemas.openxmlformats.org/drawingml/2006/main" xmlns:r="http://schemas.openxmlformats.org/officeDocument/2006/relationships" xmlns:p="http://schemas.openxmlformats.org/presentationml/2006/main">
   <p:cSld>
     <p:spTree>
@@ -5344,7 +5432,7 @@
 </p:sld>
 </file>
 
-<file path=ppt/slides/slide15.xml><?xml version="1.0" encoding="utf-8"?>
+<file path=ppt/slides/slide16.xml><?xml version="1.0" encoding="utf-8"?>
 <p:sld xmlns:a="http://schemas.openxmlformats.org/drawingml/2006/main" xmlns:r="http://schemas.openxmlformats.org/officeDocument/2006/relationships" xmlns:p="http://schemas.openxmlformats.org/presentationml/2006/main">
   <p:cSld>
     <p:spTree>
@@ -6418,7 +6506,7 @@
 </p:sld>
 </file>
 
-<file path=ppt/slides/slide16.xml><?xml version="1.0" encoding="utf-8"?>
+<file path=ppt/slides/slide17.xml><?xml version="1.0" encoding="utf-8"?>
 <p:sld xmlns:a="http://schemas.openxmlformats.org/drawingml/2006/main" xmlns:r="http://schemas.openxmlformats.org/officeDocument/2006/relationships" xmlns:p="http://schemas.openxmlformats.org/presentationml/2006/main">
   <p:cSld>
     <p:spTree>
@@ -7338,7 +7426,7 @@
 </p:sld>
 </file>
 
-<file path=ppt/slides/slide17.xml><?xml version="1.0" encoding="utf-8"?>
+<file path=ppt/slides/slide18.xml><?xml version="1.0" encoding="utf-8"?>
 <p:sld xmlns:a="http://schemas.openxmlformats.org/drawingml/2006/main" xmlns:r="http://schemas.openxmlformats.org/officeDocument/2006/relationships" xmlns:p="http://schemas.openxmlformats.org/presentationml/2006/main">
   <p:cSld>
     <p:spTree>
@@ -7384,8 +7472,8 @@
           </a:prstGeom>
         </p:spPr>
       </p:pic>
-      <mc:AlternateContent xmlns:mc="http://schemas.openxmlformats.org/markup-compatibility/2006">
-        <mc:Choice xmlns:a14="http://schemas.microsoft.com/office/drawing/2010/main" Requires="a14">
+      <mc:AlternateContent xmlns:mc="http://schemas.openxmlformats.org/markup-compatibility/2006" xmlns:a14="http://schemas.microsoft.com/office/drawing/2010/main">
+        <mc:Choice Requires="a14">
           <p:sp>
             <p:nvSpPr>
               <p:cNvPr id="10" name="Rectangle 9">
@@ -7585,7 +7673,7 @@
             </p:txBody>
           </p:sp>
         </mc:Choice>
-        <mc:Fallback>
+        <mc:Fallback xmlns="">
           <p:sp>
             <p:nvSpPr>
               <p:cNvPr id="10" name="Rectangle 9">
@@ -7662,8 +7750,8 @@
           </a:prstGeom>
         </p:spPr>
       </p:pic>
-      <mc:AlternateContent xmlns:mc="http://schemas.openxmlformats.org/markup-compatibility/2006">
-        <mc:Choice xmlns:a14="http://schemas.microsoft.com/office/drawing/2010/main" Requires="a14">
+      <mc:AlternateContent xmlns:mc="http://schemas.openxmlformats.org/markup-compatibility/2006" xmlns:a14="http://schemas.microsoft.com/office/drawing/2010/main">
+        <mc:Choice Requires="a14">
           <p:sp>
             <p:nvSpPr>
               <p:cNvPr id="8" name="Rectangle 7">
@@ -7863,7 +7951,7 @@
             </p:txBody>
           </p:sp>
         </mc:Choice>
-        <mc:Fallback>
+        <mc:Fallback xmlns="">
           <p:sp>
             <p:nvSpPr>
               <p:cNvPr id="8" name="Rectangle 7">
@@ -8626,8 +8714,8 @@
           </a:p>
         </p:txBody>
       </p:sp>
-      <mc:AlternateContent xmlns:mc="http://schemas.openxmlformats.org/markup-compatibility/2006">
-        <mc:Choice xmlns:a14="http://schemas.microsoft.com/office/drawing/2010/main" Requires="a14">
+      <mc:AlternateContent xmlns:mc="http://schemas.openxmlformats.org/markup-compatibility/2006" xmlns:a14="http://schemas.microsoft.com/office/drawing/2010/main">
+        <mc:Choice Requires="a14">
           <p:sp>
             <p:nvSpPr>
               <p:cNvPr id="3" name="Content Placeholder 2">
@@ -9413,7 +9501,7 @@
             </p:txBody>
           </p:sp>
         </mc:Choice>
-        <mc:Fallback>
+        <mc:Fallback xmlns="">
           <p:sp>
             <p:nvSpPr>
               <p:cNvPr id="3" name="Content Placeholder 2">
@@ -10597,8 +10685,8 @@
           </a:p>
         </p:txBody>
       </p:sp>
-      <mc:AlternateContent xmlns:mc="http://schemas.openxmlformats.org/markup-compatibility/2006">
-        <mc:Choice xmlns:a14="http://schemas.microsoft.com/office/drawing/2010/main" Requires="a14">
+      <mc:AlternateContent xmlns:mc="http://schemas.openxmlformats.org/markup-compatibility/2006" xmlns:a14="http://schemas.microsoft.com/office/drawing/2010/main">
+        <mc:Choice Requires="a14">
           <p:sp>
             <p:nvSpPr>
               <p:cNvPr id="3" name="Content Placeholder 2">
@@ -10716,7 +10804,7 @@
             </p:txBody>
           </p:sp>
         </mc:Choice>
-        <mc:Fallback>
+        <mc:Fallback xmlns="">
           <p:sp>
             <p:nvSpPr>
               <p:cNvPr id="3" name="Content Placeholder 2">
@@ -10790,6 +10878,58 @@
           </a:prstGeom>
         </p:spPr>
       </p:pic>
+      <p:sp>
+        <p:nvSpPr>
+          <p:cNvPr id="5" name="Rectangle 4">
+            <a:extLst>
+              <a:ext uri="{FF2B5EF4-FFF2-40B4-BE49-F238E27FC236}">
+                <a16:creationId xmlns:a16="http://schemas.microsoft.com/office/drawing/2014/main" id="{C32AB339-CF34-45AA-BF5E-C5656D468A8B}"/>
+              </a:ext>
+            </a:extLst>
+          </p:cNvPr>
+          <p:cNvSpPr/>
+          <p:nvPr/>
+        </p:nvSpPr>
+        <p:spPr>
+          <a:xfrm>
+            <a:off x="1630474" y="1365012"/>
+            <a:ext cx="4024745" cy="301770"/>
+          </a:xfrm>
+          <a:prstGeom prst="rect">
+            <a:avLst/>
+          </a:prstGeom>
+          <a:solidFill>
+            <a:schemeClr val="bg1"/>
+          </a:solidFill>
+          <a:ln>
+            <a:noFill/>
+          </a:ln>
+        </p:spPr>
+        <p:style>
+          <a:lnRef idx="2">
+            <a:schemeClr val="accent1">
+              <a:shade val="50000"/>
+            </a:schemeClr>
+          </a:lnRef>
+          <a:fillRef idx="1">
+            <a:schemeClr val="accent1"/>
+          </a:fillRef>
+          <a:effectRef idx="0">
+            <a:schemeClr val="accent1"/>
+          </a:effectRef>
+          <a:fontRef idx="minor">
+            <a:schemeClr val="lt1"/>
+          </a:fontRef>
+        </p:style>
+        <p:txBody>
+          <a:bodyPr rtlCol="0" anchor="ctr"/>
+          <a:lstStyle/>
+          <a:p>
+            <a:pPr algn="ctr"/>
+            <a:endParaRPr lang="en-ID"/>
+          </a:p>
+        </p:txBody>
+      </p:sp>
     </p:spTree>
     <p:extLst>
       <p:ext uri="{BB962C8B-B14F-4D97-AF65-F5344CB8AC3E}">
@@ -10920,7 +11060,7 @@
                 </a:pPr>
                 <a:r>
                   <a:rPr lang="en-US" sz="2000"/>
-                  <a:t>Diasumsikan BTS mengetahui informasi kanal (Perfect CSI) dan menggunakannya untuk membentuk precoding.</a:t>
+                  <a:t>Diasumsikan BTS mengetahui informasi kanal (PerfSect CSI) dan menggunakannya untuk membentuk precoding.</a:t>
                 </a:r>
               </a:p>
               <a:p>
@@ -11041,7 +11181,7 @@
                 </a:pPr>
                 <a:r>
                   <a:rPr lang="en-US" sz="2000"/>
-                  <a:t>Variasi SNR (0 dB  s.d. 15 dB)</a:t>
+                  <a:t>Variasi SNR (0 dB SS s.d. 15 dB)</a:t>
                 </a:r>
               </a:p>
               <a:p>
@@ -11113,8 +11253,8 @@
           </p:sp>
         </mc:Fallback>
       </mc:AlternateContent>
-      <mc:AlternateContent xmlns:mc="http://schemas.openxmlformats.org/markup-compatibility/2006">
-        <mc:Choice xmlns:a14="http://schemas.microsoft.com/office/drawing/2010/main" Requires="a14">
+      <mc:AlternateContent xmlns:mc="http://schemas.openxmlformats.org/markup-compatibility/2006" xmlns:a14="http://schemas.microsoft.com/office/drawing/2010/main">
+        <mc:Choice Requires="a14">
           <p:sp>
             <p:nvSpPr>
               <p:cNvPr id="11" name="Rectangle 10">
@@ -11234,7 +11374,7 @@
             </p:txBody>
           </p:sp>
         </mc:Choice>
-        <mc:Fallback>
+        <mc:Fallback xmlns="">
           <p:sp>
             <p:nvSpPr>
               <p:cNvPr id="11" name="Rectangle 10">
@@ -11311,6 +11451,58 @@
           </a:prstGeom>
         </p:spPr>
       </p:pic>
+      <p:sp>
+        <p:nvSpPr>
+          <p:cNvPr id="2" name="Rectangle 1">
+            <a:extLst>
+              <a:ext uri="{FF2B5EF4-FFF2-40B4-BE49-F238E27FC236}">
+                <a16:creationId xmlns:a16="http://schemas.microsoft.com/office/drawing/2014/main" id="{E21D5B95-1A5E-4224-BA8A-207A12308ED1}"/>
+              </a:ext>
+            </a:extLst>
+          </p:cNvPr>
+          <p:cNvSpPr/>
+          <p:nvPr/>
+        </p:nvSpPr>
+        <p:spPr>
+          <a:xfrm>
+            <a:off x="1762125" y="1666875"/>
+            <a:ext cx="2666423" cy="228600"/>
+          </a:xfrm>
+          <a:prstGeom prst="rect">
+            <a:avLst/>
+          </a:prstGeom>
+          <a:solidFill>
+            <a:schemeClr val="bg1"/>
+          </a:solidFill>
+          <a:ln>
+            <a:noFill/>
+          </a:ln>
+        </p:spPr>
+        <p:style>
+          <a:lnRef idx="2">
+            <a:schemeClr val="accent1">
+              <a:shade val="50000"/>
+            </a:schemeClr>
+          </a:lnRef>
+          <a:fillRef idx="1">
+            <a:schemeClr val="accent1"/>
+          </a:fillRef>
+          <a:effectRef idx="0">
+            <a:schemeClr val="accent1"/>
+          </a:effectRef>
+          <a:fontRef idx="minor">
+            <a:schemeClr val="lt1"/>
+          </a:fontRef>
+        </p:style>
+        <p:txBody>
+          <a:bodyPr rtlCol="0" anchor="ctr"/>
+          <a:lstStyle/>
+          <a:p>
+            <a:pPr algn="ctr"/>
+            <a:endParaRPr lang="en-ID"/>
+          </a:p>
+        </p:txBody>
+      </p:sp>
     </p:spTree>
     <p:extLst>
       <p:ext uri="{BB962C8B-B14F-4D97-AF65-F5344CB8AC3E}">
@@ -11399,7 +11591,7 @@
         </p:blipFill>
         <p:spPr>
           <a:xfrm>
-            <a:off x="24439" y="1683314"/>
+            <a:off x="98869" y="1683314"/>
             <a:ext cx="5859276" cy="5016758"/>
           </a:xfrm>
           <a:prstGeom prst="rect">
@@ -11423,8 +11615,8 @@
             </p:nvSpPr>
             <p:spPr>
               <a:xfrm>
-                <a:off x="5883715" y="1566612"/>
-                <a:ext cx="5880917" cy="5016758"/>
+                <a:off x="6413501" y="1566612"/>
+                <a:ext cx="4821346" cy="5940088"/>
               </a:xfrm>
               <a:prstGeom prst="rect">
                 <a:avLst/>
@@ -11586,8 +11778,8 @@
             </p:nvSpPr>
             <p:spPr>
               <a:xfrm>
-                <a:off x="5883715" y="1566612"/>
-                <a:ext cx="5880917" cy="5016758"/>
+                <a:off x="6413501" y="1566612"/>
+                <a:ext cx="4821346" cy="5940088"/>
               </a:xfrm>
               <a:prstGeom prst="rect">
                 <a:avLst/>
@@ -11595,7 +11787,7 @@
               <a:blipFill>
                 <a:blip r:embed="rId3"/>
                 <a:stretch>
-                  <a:fillRect l="-933" t="-729" b="-1215"/>
+                  <a:fillRect l="-1138" t="-616" r="-632" b="-924"/>
                 </a:stretch>
               </a:blipFill>
             </p:spPr>
@@ -11614,6 +11806,58 @@
           </p:sp>
         </mc:Fallback>
       </mc:AlternateContent>
+      <p:sp>
+        <p:nvSpPr>
+          <p:cNvPr id="6" name="Rectangle 5">
+            <a:extLst>
+              <a:ext uri="{FF2B5EF4-FFF2-40B4-BE49-F238E27FC236}">
+                <a16:creationId xmlns:a16="http://schemas.microsoft.com/office/drawing/2014/main" id="{9FF58475-97B0-4FF6-9435-2EEE5B771FF4}"/>
+              </a:ext>
+            </a:extLst>
+          </p:cNvPr>
+          <p:cNvSpPr/>
+          <p:nvPr/>
+        </p:nvSpPr>
+        <p:spPr>
+          <a:xfrm>
+            <a:off x="1407191" y="1724879"/>
+            <a:ext cx="3265272" cy="279941"/>
+          </a:xfrm>
+          <a:prstGeom prst="rect">
+            <a:avLst/>
+          </a:prstGeom>
+          <a:solidFill>
+            <a:schemeClr val="bg1"/>
+          </a:solidFill>
+          <a:ln>
+            <a:noFill/>
+          </a:ln>
+        </p:spPr>
+        <p:style>
+          <a:lnRef idx="2">
+            <a:schemeClr val="accent1">
+              <a:shade val="50000"/>
+            </a:schemeClr>
+          </a:lnRef>
+          <a:fillRef idx="1">
+            <a:schemeClr val="accent1"/>
+          </a:fillRef>
+          <a:effectRef idx="0">
+            <a:schemeClr val="accent1"/>
+          </a:effectRef>
+          <a:fontRef idx="minor">
+            <a:schemeClr val="lt1"/>
+          </a:fontRef>
+        </p:style>
+        <p:txBody>
+          <a:bodyPr rtlCol="0" anchor="ctr"/>
+          <a:lstStyle/>
+          <a:p>
+            <a:pPr algn="ctr"/>
+            <a:endParaRPr lang="en-ID"/>
+          </a:p>
+        </p:txBody>
+      </p:sp>
     </p:spTree>
     <p:extLst>
       <p:ext uri="{BB962C8B-B14F-4D97-AF65-F5344CB8AC3E}">
@@ -11681,8 +11925,8 @@
           </a:p>
         </p:txBody>
       </p:sp>
-      <mc:AlternateContent xmlns:mc="http://schemas.openxmlformats.org/markup-compatibility/2006">
-        <mc:Choice xmlns:a14="http://schemas.microsoft.com/office/drawing/2010/main" Requires="a14">
+      <mc:AlternateContent xmlns:mc="http://schemas.openxmlformats.org/markup-compatibility/2006" xmlns:a14="http://schemas.microsoft.com/office/drawing/2010/main">
+        <mc:Choice Requires="a14">
           <p:sp>
             <p:nvSpPr>
               <p:cNvPr id="5" name="Rectangle 4">
@@ -11789,7 +12033,7 @@
             </p:txBody>
           </p:sp>
         </mc:Choice>
-        <mc:Fallback>
+        <mc:Fallback xmlns="">
           <p:sp>
             <p:nvSpPr>
               <p:cNvPr id="5" name="Rectangle 4">
@@ -13646,6 +13890,58 @@
           </a:p>
         </p:txBody>
       </p:sp>
+      <p:sp>
+        <p:nvSpPr>
+          <p:cNvPr id="7" name="Rectangle 6">
+            <a:extLst>
+              <a:ext uri="{FF2B5EF4-FFF2-40B4-BE49-F238E27FC236}">
+                <a16:creationId xmlns:a16="http://schemas.microsoft.com/office/drawing/2014/main" id="{7CC6D76F-2937-4EC1-BEC2-F61A4BB98FBE}"/>
+              </a:ext>
+            </a:extLst>
+          </p:cNvPr>
+          <p:cNvSpPr/>
+          <p:nvPr/>
+        </p:nvSpPr>
+        <p:spPr>
+          <a:xfrm>
+            <a:off x="1777132" y="1050925"/>
+            <a:ext cx="4024745" cy="301770"/>
+          </a:xfrm>
+          <a:prstGeom prst="rect">
+            <a:avLst/>
+          </a:prstGeom>
+          <a:solidFill>
+            <a:schemeClr val="bg1"/>
+          </a:solidFill>
+          <a:ln>
+            <a:noFill/>
+          </a:ln>
+        </p:spPr>
+        <p:style>
+          <a:lnRef idx="2">
+            <a:schemeClr val="accent1">
+              <a:shade val="50000"/>
+            </a:schemeClr>
+          </a:lnRef>
+          <a:fillRef idx="1">
+            <a:schemeClr val="accent1"/>
+          </a:fillRef>
+          <a:effectRef idx="0">
+            <a:schemeClr val="accent1"/>
+          </a:effectRef>
+          <a:fontRef idx="minor">
+            <a:schemeClr val="lt1"/>
+          </a:fontRef>
+        </p:style>
+        <p:txBody>
+          <a:bodyPr rtlCol="0" anchor="ctr"/>
+          <a:lstStyle/>
+          <a:p>
+            <a:pPr algn="ctr"/>
+            <a:endParaRPr lang="en-ID"/>
+          </a:p>
+        </p:txBody>
+      </p:sp>
     </p:spTree>
     <p:extLst>
       <p:ext uri="{BB962C8B-B14F-4D97-AF65-F5344CB8AC3E}">

</xml_diff>